<commit_message>
Updated presentation. Added Waxeye binary and library. Fixes in Cocoon sitemap.
</commit_message>
<xml_diff>
--- a/Anything To XML.pptx
+++ b/Anything To XML.pptx
@@ -481,7 +481,7 @@
           <a:p>
             <a:fld id="{5299EB3A-100C-4295-B4A7-E81E95A47A5F}" type="datetimeFigureOut">
               <a:rPr lang="nl-NL" smtClean="0"/>
-              <a:t>12-3-2016</a:t>
+              <a:t>15-3-2016</a:t>
             </a:fld>
             <a:endParaRPr lang="nl-NL"/>
           </a:p>
@@ -664,7 +664,7 @@
           <a:p>
             <a:fld id="{5299EB3A-100C-4295-B4A7-E81E95A47A5F}" type="datetimeFigureOut">
               <a:rPr lang="nl-NL" smtClean="0"/>
-              <a:t>12-3-2016</a:t>
+              <a:t>15-3-2016</a:t>
             </a:fld>
             <a:endParaRPr lang="nl-NL"/>
           </a:p>
@@ -860,7 +860,7 @@
           <a:p>
             <a:fld id="{5299EB3A-100C-4295-B4A7-E81E95A47A5F}" type="datetimeFigureOut">
               <a:rPr lang="nl-NL" smtClean="0"/>
-              <a:t>12-3-2016</a:t>
+              <a:t>15-3-2016</a:t>
             </a:fld>
             <a:endParaRPr lang="nl-NL"/>
           </a:p>
@@ -1130,7 +1130,7 @@
           <a:p>
             <a:fld id="{5299EB3A-100C-4295-B4A7-E81E95A47A5F}" type="datetimeFigureOut">
               <a:rPr lang="nl-NL" smtClean="0"/>
-              <a:t>12-3-2016</a:t>
+              <a:t>15-3-2016</a:t>
             </a:fld>
             <a:endParaRPr lang="nl-NL"/>
           </a:p>
@@ -1486,7 +1486,7 @@
           <a:p>
             <a:fld id="{5299EB3A-100C-4295-B4A7-E81E95A47A5F}" type="datetimeFigureOut">
               <a:rPr lang="nl-NL" smtClean="0"/>
-              <a:t>12-3-2016</a:t>
+              <a:t>15-3-2016</a:t>
             </a:fld>
             <a:endParaRPr lang="nl-NL"/>
           </a:p>
@@ -1802,7 +1802,7 @@
           <a:p>
             <a:fld id="{5299EB3A-100C-4295-B4A7-E81E95A47A5F}" type="datetimeFigureOut">
               <a:rPr lang="nl-NL" smtClean="0"/>
-              <a:t>12-3-2016</a:t>
+              <a:t>15-3-2016</a:t>
             </a:fld>
             <a:endParaRPr lang="nl-NL"/>
           </a:p>
@@ -2037,7 +2037,7 @@
           <a:p>
             <a:fld id="{5299EB3A-100C-4295-B4A7-E81E95A47A5F}" type="datetimeFigureOut">
               <a:rPr lang="nl-NL" smtClean="0"/>
-              <a:t>12-3-2016</a:t>
+              <a:t>15-3-2016</a:t>
             </a:fld>
             <a:endParaRPr lang="nl-NL"/>
           </a:p>
@@ -2135,7 +2135,7 @@
           <a:p>
             <a:fld id="{5299EB3A-100C-4295-B4A7-E81E95A47A5F}" type="datetimeFigureOut">
               <a:rPr lang="nl-NL" smtClean="0"/>
-              <a:t>12-3-2016</a:t>
+              <a:t>15-3-2016</a:t>
             </a:fld>
             <a:endParaRPr lang="nl-NL"/>
           </a:p>
@@ -2431,7 +2431,7 @@
           <a:p>
             <a:fld id="{5299EB3A-100C-4295-B4A7-E81E95A47A5F}" type="datetimeFigureOut">
               <a:rPr lang="nl-NL" smtClean="0"/>
-              <a:t>12-3-2016</a:t>
+              <a:t>15-3-2016</a:t>
             </a:fld>
             <a:endParaRPr lang="nl-NL"/>
           </a:p>
@@ -2708,7 +2708,7 @@
           <a:p>
             <a:fld id="{5299EB3A-100C-4295-B4A7-E81E95A47A5F}" type="datetimeFigureOut">
               <a:rPr lang="nl-NL" smtClean="0"/>
-              <a:t>12-3-2016</a:t>
+              <a:t>15-3-2016</a:t>
             </a:fld>
             <a:endParaRPr lang="nl-NL"/>
           </a:p>
@@ -3447,7 +3447,7 @@
         </p:nvSpPr>
         <p:spPr>
           <a:xfrm>
-            <a:off x="685800" y="609601"/>
+            <a:off x="683568" y="404664"/>
             <a:ext cx="7772400" cy="3683495"/>
           </a:xfrm>
         </p:spPr>
@@ -3487,7 +3487,12 @@
             <p:ph type="subTitle" idx="1"/>
           </p:nvPr>
         </p:nvSpPr>
-        <p:spPr/>
+        <p:spPr>
+          <a:xfrm>
+            <a:off x="1331640" y="4797152"/>
+            <a:ext cx="6400800" cy="1219200"/>
+          </a:xfrm>
+        </p:spPr>
         <p:txBody>
           <a:bodyPr>
             <a:normAutofit fontScale="92500" lnSpcReduction="10000"/>
@@ -3505,6 +3510,10 @@
             <a:endParaRPr lang="en-US" dirty="0" smtClean="0"/>
           </a:p>
           <a:p>
+            <a:r>
+              <a:rPr lang="en-US" dirty="0" smtClean="0"/>
+              <a:t>Consulting Software Architect, </a:t>
+            </a:r>
             <a:r>
               <a:rPr lang="en-US" dirty="0" err="1" smtClean="0"/>
               <a:t>Rakensi</a:t>
@@ -4246,11 +4255,7 @@
           <a:p>
             <a:r>
               <a:rPr lang="en-US" dirty="0" smtClean="0"/>
-              <a:t>Demo </a:t>
-            </a:r>
-            <a:r>
-              <a:rPr lang="en-US" dirty="0" smtClean="0"/>
-              <a:t>(</a:t>
+              <a:t>Demo (</a:t>
             </a:r>
             <a:r>
               <a:rPr lang="en-US" dirty="0" err="1" smtClean="0"/>
@@ -4272,7 +4277,7 @@
         </p:nvSpPr>
         <p:spPr>
           <a:xfrm>
-            <a:off x="-1" y="2348880"/>
+            <a:off x="0" y="2204864"/>
             <a:ext cx="16140957" cy="3416320"/>
           </a:xfrm>
           <a:prstGeom prst="rect">
@@ -4532,6 +4537,36 @@
             <a:r>
               <a:rPr lang="en-US" sz="1600" dirty="0"/>
               <a:t>http://www.balisage.net/Proceedings/vol10/html/Kay01/BalisageVol10-Kay01.html</a:t>
+            </a:r>
+            <a:endParaRPr lang="nl-NL" sz="1600" dirty="0"/>
+          </a:p>
+        </p:txBody>
+      </p:sp>
+      <p:sp>
+        <p:nvSpPr>
+          <p:cNvPr id="6" name="TextBox 5"/>
+          <p:cNvSpPr txBox="1"/>
+          <p:nvPr/>
+        </p:nvSpPr>
+        <p:spPr>
+          <a:xfrm>
+            <a:off x="609675" y="5765200"/>
+            <a:ext cx="3271408" cy="338554"/>
+          </a:xfrm>
+          <a:prstGeom prst="rect">
+            <a:avLst/>
+          </a:prstGeom>
+          <a:noFill/>
+        </p:spPr>
+        <p:txBody>
+          <a:bodyPr wrap="none" rtlCol="0">
+            <a:spAutoFit/>
+          </a:bodyPr>
+          <a:lstStyle/>
+          <a:p>
+            <a:r>
+              <a:rPr lang="nl-NL" sz="1600" dirty="0"/>
+              <a:t>https://github.com/nverwer/iXML</a:t>
             </a:r>
             <a:endParaRPr lang="nl-NL" sz="1600" dirty="0"/>
           </a:p>
@@ -5635,7 +5670,15 @@
             </a:r>
             <a:r>
               <a:rPr lang="en-US" dirty="0" smtClean="0"/>
-              <a:t> grammar we threw away terminals.</a:t>
+              <a:t> grammar we threw away </a:t>
+            </a:r>
+            <a:r>
+              <a:rPr lang="en-US" dirty="0" smtClean="0"/>
+              <a:t>some terminals</a:t>
+            </a:r>
+            <a:r>
+              <a:rPr lang="en-US" dirty="0" smtClean="0"/>
+              <a:t>.</a:t>
             </a:r>
           </a:p>
         </p:txBody>
@@ -5768,6 +5811,27 @@
             <a:endParaRPr lang="en-US" dirty="0"/>
           </a:p>
           <a:p>
+            <a:r>
+              <a:rPr lang="en-US" dirty="0" smtClean="0"/>
+              <a:t>Make the parser “see through” XML markup.</a:t>
+            </a:r>
+          </a:p>
+          <a:p>
+            <a:pPr lvl="1"/>
+            <a:r>
+              <a:rPr lang="en-US" dirty="0" smtClean="0"/>
+              <a:t>Generate additional structure in XML documents.</a:t>
+            </a:r>
+          </a:p>
+          <a:p>
+            <a:pPr lvl="1"/>
+            <a:r>
+              <a:rPr lang="en-US" dirty="0" smtClean="0"/>
+              <a:t>Parse tree must lead to well-formed XML.</a:t>
+            </a:r>
+            <a:endParaRPr lang="en-US" dirty="0" smtClean="0"/>
+          </a:p>
+          <a:p>
             <a:endParaRPr lang="en-US" dirty="0" smtClean="0"/>
           </a:p>
         </p:txBody>
@@ -5854,11 +5918,7 @@
           <a:p>
             <a:r>
               <a:rPr lang="en-US" dirty="0" smtClean="0"/>
-              <a:t>XML has a great </a:t>
-            </a:r>
-            <a:r>
-              <a:rPr lang="en-US" dirty="0" smtClean="0"/>
-              <a:t>toolbox (XSLT, </a:t>
+              <a:t>XML has a great toolbox (XSLT, </a:t>
             </a:r>
             <a:r>
               <a:rPr lang="en-US" dirty="0" err="1" smtClean="0"/>
@@ -5947,7 +6007,19 @@
           <a:p>
             <a:r>
               <a:rPr lang="en-US" dirty="0" smtClean="0"/>
-              <a:t>Convert input to XML.</a:t>
+              <a:t>Convert </a:t>
+            </a:r>
+            <a:r>
+              <a:rPr lang="en-US" dirty="0" smtClean="0"/>
+              <a:t>(character-based) </a:t>
+            </a:r>
+            <a:r>
+              <a:rPr lang="en-US" dirty="0" smtClean="0"/>
+              <a:t>input </a:t>
+            </a:r>
+            <a:r>
+              <a:rPr lang="en-US" dirty="0" smtClean="0"/>
+              <a:t>to XML.</a:t>
             </a:r>
           </a:p>
           <a:p>
@@ -6386,805 +6458,838 @@
           </a:p>
         </p:txBody>
       </p:sp>
-      <p:grpSp>
-        <p:nvGrpSpPr>
-          <p:cNvPr id="4" name="Group 3"/>
-          <p:cNvGrpSpPr/>
+      <p:cxnSp>
+        <p:nvCxnSpPr>
+          <p:cNvPr id="5" name="Straight Connector 4"/>
+          <p:cNvCxnSpPr>
+            <a:stCxn id="15" idx="3"/>
+            <a:endCxn id="16" idx="0"/>
+          </p:cNvCxnSpPr>
           <p:nvPr/>
-        </p:nvGrpSpPr>
-        <p:grpSpPr>
-          <a:xfrm>
-            <a:off x="911499" y="2793522"/>
-            <a:ext cx="7560840" cy="2223468"/>
-            <a:chOff x="410587" y="1988840"/>
-            <a:chExt cx="8347199" cy="3087564"/>
-          </a:xfrm>
-        </p:grpSpPr>
-        <p:cxnSp>
-          <p:nvCxnSpPr>
-            <p:cNvPr id="5" name="Straight Connector 4"/>
-            <p:cNvCxnSpPr>
-              <a:stCxn id="15" idx="3"/>
-              <a:endCxn id="16" idx="0"/>
-            </p:cNvCxnSpPr>
-            <p:nvPr/>
-          </p:nvCxnSpPr>
-          <p:spPr>
-            <a:xfrm flipH="1">
-              <a:off x="1691680" y="2542004"/>
-              <a:ext cx="2306949" cy="310932"/>
-            </a:xfrm>
-            <a:prstGeom prst="line">
-              <a:avLst/>
-            </a:prstGeom>
-            <a:ln w="38100"/>
-          </p:spPr>
-          <p:style>
-            <a:lnRef idx="1">
-              <a:schemeClr val="accent1"/>
-            </a:lnRef>
-            <a:fillRef idx="0">
-              <a:schemeClr val="accent1"/>
-            </a:fillRef>
-            <a:effectRef idx="0">
-              <a:schemeClr val="accent1"/>
-            </a:effectRef>
-            <a:fontRef idx="minor">
-              <a:schemeClr val="tx1"/>
-            </a:fontRef>
-          </p:style>
-        </p:cxnSp>
-        <p:cxnSp>
-          <p:nvCxnSpPr>
-            <p:cNvPr id="6" name="Straight Connector 5"/>
-            <p:cNvCxnSpPr>
-              <a:stCxn id="15" idx="4"/>
-              <a:endCxn id="18" idx="0"/>
-            </p:cNvCxnSpPr>
-            <p:nvPr/>
-          </p:nvCxnSpPr>
-          <p:spPr>
-            <a:xfrm>
-              <a:off x="4864224" y="2636912"/>
-              <a:ext cx="0" cy="216024"/>
-            </a:xfrm>
-            <a:prstGeom prst="line">
-              <a:avLst/>
-            </a:prstGeom>
-            <a:ln w="38100"/>
-          </p:spPr>
-          <p:style>
-            <a:lnRef idx="1">
-              <a:schemeClr val="accent1"/>
-            </a:lnRef>
-            <a:fillRef idx="0">
-              <a:schemeClr val="accent1"/>
-            </a:fillRef>
-            <a:effectRef idx="0">
-              <a:schemeClr val="accent1"/>
-            </a:effectRef>
-            <a:fontRef idx="minor">
-              <a:schemeClr val="tx1"/>
-            </a:fontRef>
-          </p:style>
-        </p:cxnSp>
-        <p:cxnSp>
-          <p:nvCxnSpPr>
-            <p:cNvPr id="7" name="Straight Connector 6"/>
-            <p:cNvCxnSpPr>
-              <a:stCxn id="15" idx="5"/>
-              <a:endCxn id="17" idx="0"/>
-            </p:cNvCxnSpPr>
-            <p:nvPr/>
-          </p:nvCxnSpPr>
-          <p:spPr>
-            <a:xfrm>
-              <a:off x="5729819" y="2542004"/>
-              <a:ext cx="2010533" cy="310932"/>
-            </a:xfrm>
-            <a:prstGeom prst="line">
-              <a:avLst/>
-            </a:prstGeom>
-            <a:ln w="38100"/>
-          </p:spPr>
-          <p:style>
-            <a:lnRef idx="1">
-              <a:schemeClr val="accent1"/>
-            </a:lnRef>
-            <a:fillRef idx="0">
-              <a:schemeClr val="accent1"/>
-            </a:fillRef>
-            <a:effectRef idx="0">
-              <a:schemeClr val="accent1"/>
-            </a:effectRef>
-            <a:fontRef idx="minor">
-              <a:schemeClr val="tx1"/>
-            </a:fontRef>
-          </p:style>
-        </p:cxnSp>
-        <p:cxnSp>
-          <p:nvCxnSpPr>
-            <p:cNvPr id="8" name="Straight Connector 7"/>
-            <p:cNvCxnSpPr>
-              <a:stCxn id="16" idx="4"/>
-              <a:endCxn id="19" idx="0"/>
-            </p:cNvCxnSpPr>
-            <p:nvPr/>
-          </p:nvCxnSpPr>
-          <p:spPr>
-            <a:xfrm>
-              <a:off x="1691680" y="3501008"/>
-              <a:ext cx="0" cy="152400"/>
-            </a:xfrm>
-            <a:prstGeom prst="line">
-              <a:avLst/>
-            </a:prstGeom>
-            <a:ln w="38100"/>
-          </p:spPr>
-          <p:style>
-            <a:lnRef idx="1">
-              <a:schemeClr val="accent1"/>
-            </a:lnRef>
-            <a:fillRef idx="0">
-              <a:schemeClr val="accent1"/>
-            </a:fillRef>
-            <a:effectRef idx="0">
-              <a:schemeClr val="accent1"/>
-            </a:effectRef>
-            <a:fontRef idx="minor">
-              <a:schemeClr val="tx1"/>
-            </a:fontRef>
-          </p:style>
-        </p:cxnSp>
-        <p:cxnSp>
-          <p:nvCxnSpPr>
-            <p:cNvPr id="9" name="Straight Connector 8"/>
-            <p:cNvCxnSpPr>
-              <a:stCxn id="19" idx="4"/>
-              <a:endCxn id="23" idx="0"/>
-            </p:cNvCxnSpPr>
-            <p:nvPr/>
-          </p:nvCxnSpPr>
-          <p:spPr>
-            <a:xfrm>
-              <a:off x="1691680" y="4301480"/>
-              <a:ext cx="0" cy="283686"/>
-            </a:xfrm>
-            <a:prstGeom prst="line">
-              <a:avLst/>
-            </a:prstGeom>
-            <a:ln w="38100"/>
-          </p:spPr>
-          <p:style>
-            <a:lnRef idx="1">
-              <a:schemeClr val="accent1"/>
-            </a:lnRef>
-            <a:fillRef idx="0">
-              <a:schemeClr val="accent1"/>
-            </a:fillRef>
-            <a:effectRef idx="0">
-              <a:schemeClr val="accent1"/>
-            </a:effectRef>
-            <a:fontRef idx="minor">
-              <a:schemeClr val="tx1"/>
-            </a:fontRef>
-          </p:style>
-        </p:cxnSp>
-        <p:cxnSp>
-          <p:nvCxnSpPr>
-            <p:cNvPr id="10" name="Straight Connector 9"/>
-            <p:cNvCxnSpPr>
-              <a:stCxn id="19" idx="3"/>
-              <a:endCxn id="22" idx="0"/>
-            </p:cNvCxnSpPr>
-            <p:nvPr/>
-          </p:nvCxnSpPr>
-          <p:spPr>
-            <a:xfrm flipH="1">
-              <a:off x="618336" y="4206572"/>
-              <a:ext cx="207749" cy="365775"/>
-            </a:xfrm>
-            <a:prstGeom prst="line">
-              <a:avLst/>
-            </a:prstGeom>
-            <a:ln w="38100"/>
-          </p:spPr>
-          <p:style>
-            <a:lnRef idx="1">
-              <a:schemeClr val="accent1"/>
-            </a:lnRef>
-            <a:fillRef idx="0">
-              <a:schemeClr val="accent1"/>
-            </a:fillRef>
-            <a:effectRef idx="0">
-              <a:schemeClr val="accent1"/>
-            </a:effectRef>
-            <a:fontRef idx="minor">
-              <a:schemeClr val="tx1"/>
-            </a:fontRef>
-          </p:style>
-        </p:cxnSp>
-        <p:cxnSp>
-          <p:nvCxnSpPr>
-            <p:cNvPr id="11" name="Straight Connector 10"/>
-            <p:cNvCxnSpPr>
-              <a:stCxn id="19" idx="5"/>
-              <a:endCxn id="24" idx="0"/>
-            </p:cNvCxnSpPr>
-            <p:nvPr/>
-          </p:nvCxnSpPr>
-          <p:spPr>
-            <a:xfrm>
-              <a:off x="2557275" y="4206572"/>
-              <a:ext cx="150792" cy="248471"/>
-            </a:xfrm>
-            <a:prstGeom prst="line">
-              <a:avLst/>
-            </a:prstGeom>
-            <a:ln w="38100"/>
-          </p:spPr>
-          <p:style>
-            <a:lnRef idx="1">
-              <a:schemeClr val="accent1"/>
-            </a:lnRef>
-            <a:fillRef idx="0">
-              <a:schemeClr val="accent1"/>
-            </a:fillRef>
-            <a:effectRef idx="0">
-              <a:schemeClr val="accent1"/>
-            </a:effectRef>
-            <a:fontRef idx="minor">
-              <a:schemeClr val="tx1"/>
-            </a:fontRef>
-          </p:style>
-        </p:cxnSp>
-        <p:cxnSp>
-          <p:nvCxnSpPr>
-            <p:cNvPr id="12" name="Straight Connector 11"/>
-            <p:cNvCxnSpPr>
-              <a:stCxn id="18" idx="4"/>
-              <a:endCxn id="20" idx="0"/>
-            </p:cNvCxnSpPr>
-            <p:nvPr/>
-          </p:nvCxnSpPr>
-          <p:spPr>
-            <a:xfrm>
-              <a:off x="4864224" y="3501008"/>
-              <a:ext cx="0" cy="152400"/>
-            </a:xfrm>
-            <a:prstGeom prst="line">
-              <a:avLst/>
-            </a:prstGeom>
-            <a:ln w="38100"/>
-          </p:spPr>
-          <p:style>
-            <a:lnRef idx="1">
-              <a:schemeClr val="accent1"/>
-            </a:lnRef>
-            <a:fillRef idx="0">
-              <a:schemeClr val="accent1"/>
-            </a:fillRef>
-            <a:effectRef idx="0">
-              <a:schemeClr val="accent1"/>
-            </a:effectRef>
-            <a:fontRef idx="minor">
-              <a:schemeClr val="tx1"/>
-            </a:fontRef>
-          </p:style>
-        </p:cxnSp>
-        <p:cxnSp>
-          <p:nvCxnSpPr>
-            <p:cNvPr id="13" name="Straight Connector 12"/>
-            <p:cNvCxnSpPr>
-              <a:stCxn id="20" idx="4"/>
-              <a:endCxn id="21" idx="0"/>
-            </p:cNvCxnSpPr>
-            <p:nvPr/>
-          </p:nvCxnSpPr>
-          <p:spPr>
-            <a:xfrm>
-              <a:off x="4864224" y="4301480"/>
-              <a:ext cx="0" cy="270867"/>
-            </a:xfrm>
-            <a:prstGeom prst="line">
-              <a:avLst/>
-            </a:prstGeom>
-            <a:ln w="38100"/>
-          </p:spPr>
-          <p:style>
-            <a:lnRef idx="1">
-              <a:schemeClr val="accent1"/>
-            </a:lnRef>
-            <a:fillRef idx="0">
-              <a:schemeClr val="accent1"/>
-            </a:fillRef>
-            <a:effectRef idx="0">
-              <a:schemeClr val="accent1"/>
-            </a:effectRef>
-            <a:fontRef idx="minor">
-              <a:schemeClr val="tx1"/>
-            </a:fontRef>
-          </p:style>
-        </p:cxnSp>
-        <p:cxnSp>
-          <p:nvCxnSpPr>
-            <p:cNvPr id="14" name="Straight Connector 13"/>
-            <p:cNvCxnSpPr>
-              <a:stCxn id="17" idx="4"/>
-              <a:endCxn id="25" idx="0"/>
-            </p:cNvCxnSpPr>
-            <p:nvPr/>
-          </p:nvCxnSpPr>
-          <p:spPr>
-            <a:xfrm>
-              <a:off x="7740352" y="3501007"/>
-              <a:ext cx="6083" cy="1084160"/>
-            </a:xfrm>
-            <a:prstGeom prst="line">
-              <a:avLst/>
-            </a:prstGeom>
-            <a:ln w="38100">
-              <a:prstDash val="dash"/>
-            </a:ln>
-          </p:spPr>
-          <p:style>
-            <a:lnRef idx="1">
-              <a:schemeClr val="accent1"/>
-            </a:lnRef>
-            <a:fillRef idx="0">
-              <a:schemeClr val="accent1"/>
-            </a:fillRef>
-            <a:effectRef idx="0">
-              <a:schemeClr val="accent1"/>
-            </a:effectRef>
-            <a:fontRef idx="minor">
-              <a:schemeClr val="tx1"/>
-            </a:fontRef>
-          </p:style>
-        </p:cxnSp>
-        <p:sp>
-          <p:nvSpPr>
-            <p:cNvPr id="15" name="Oval 14"/>
-            <p:cNvSpPr/>
-            <p:nvPr/>
-          </p:nvSpPr>
-          <p:spPr>
-            <a:xfrm>
-              <a:off x="3640088" y="1988840"/>
-              <a:ext cx="2448272" cy="648072"/>
-            </a:xfrm>
-            <a:prstGeom prst="ellipse">
-              <a:avLst/>
-            </a:prstGeom>
-          </p:spPr>
-          <p:style>
-            <a:lnRef idx="2">
-              <a:schemeClr val="accent1">
-                <a:shade val="50000"/>
-              </a:schemeClr>
-            </a:lnRef>
-            <a:fillRef idx="1">
-              <a:schemeClr val="accent1"/>
-            </a:fillRef>
-            <a:effectRef idx="0">
-              <a:schemeClr val="accent1"/>
-            </a:effectRef>
-            <a:fontRef idx="minor">
-              <a:schemeClr val="lt1"/>
-            </a:fontRef>
-          </p:style>
-          <p:txBody>
-            <a:bodyPr rtlCol="0" anchor="ctr"/>
-            <a:lstStyle/>
-            <a:p>
-              <a:pPr algn="ctr"/>
-              <a:r>
-                <a:rPr lang="en-US" dirty="0" smtClean="0"/>
-                <a:t>reference</a:t>
-              </a:r>
-              <a:endParaRPr lang="nl-NL" dirty="0"/>
-            </a:p>
-          </p:txBody>
-        </p:sp>
-        <p:sp>
-          <p:nvSpPr>
-            <p:cNvPr id="16" name="Oval 15"/>
-            <p:cNvSpPr/>
-            <p:nvPr/>
-          </p:nvSpPr>
-          <p:spPr>
-            <a:xfrm>
-              <a:off x="467544" y="2852936"/>
-              <a:ext cx="2448272" cy="648072"/>
-            </a:xfrm>
-            <a:prstGeom prst="ellipse">
-              <a:avLst/>
-            </a:prstGeom>
-          </p:spPr>
-          <p:style>
-            <a:lnRef idx="2">
-              <a:schemeClr val="accent1">
-                <a:shade val="50000"/>
-              </a:schemeClr>
-            </a:lnRef>
-            <a:fillRef idx="1">
-              <a:schemeClr val="accent1"/>
-            </a:fillRef>
-            <a:effectRef idx="0">
-              <a:schemeClr val="accent1"/>
-            </a:effectRef>
-            <a:fontRef idx="minor">
-              <a:schemeClr val="lt1"/>
-            </a:fontRef>
-          </p:style>
-          <p:txBody>
-            <a:bodyPr rtlCol="0" anchor="ctr"/>
-            <a:lstStyle/>
-            <a:p>
-              <a:pPr algn="ctr"/>
-              <a:r>
-                <a:rPr lang="en-US" dirty="0" smtClean="0"/>
-                <a:t>elements</a:t>
-              </a:r>
-              <a:endParaRPr lang="nl-NL" dirty="0"/>
-            </a:p>
-          </p:txBody>
-        </p:sp>
-        <p:sp>
-          <p:nvSpPr>
-            <p:cNvPr id="17" name="Oval 16"/>
-            <p:cNvSpPr/>
-            <p:nvPr/>
-          </p:nvSpPr>
-          <p:spPr>
-            <a:xfrm>
-              <a:off x="6948264" y="2852936"/>
-              <a:ext cx="1584176" cy="648072"/>
-            </a:xfrm>
-            <a:prstGeom prst="ellipse">
-              <a:avLst/>
-            </a:prstGeom>
-          </p:spPr>
-          <p:style>
-            <a:lnRef idx="2">
-              <a:schemeClr val="accent1">
-                <a:shade val="50000"/>
-              </a:schemeClr>
-            </a:lnRef>
-            <a:fillRef idx="1">
-              <a:schemeClr val="accent1"/>
-            </a:fillRef>
-            <a:effectRef idx="0">
-              <a:schemeClr val="accent1"/>
-            </a:effectRef>
-            <a:fontRef idx="minor">
-              <a:schemeClr val="lt1"/>
-            </a:fontRef>
-          </p:style>
-          <p:txBody>
-            <a:bodyPr rtlCol="0" anchor="ctr"/>
-            <a:lstStyle/>
-            <a:p>
-              <a:pPr algn="ctr"/>
-              <a:r>
-                <a:rPr lang="nl-NL" dirty="0" smtClean="0"/>
-                <a:t>law</a:t>
-              </a:r>
-              <a:endParaRPr lang="nl-NL" dirty="0"/>
-            </a:p>
-          </p:txBody>
-        </p:sp>
-        <p:sp>
-          <p:nvSpPr>
-            <p:cNvPr id="18" name="Oval 17"/>
-            <p:cNvSpPr/>
-            <p:nvPr/>
-          </p:nvSpPr>
-          <p:spPr>
-            <a:xfrm>
-              <a:off x="3140224" y="2852936"/>
-              <a:ext cx="3448000" cy="648072"/>
-            </a:xfrm>
-            <a:prstGeom prst="ellipse">
-              <a:avLst/>
-            </a:prstGeom>
-          </p:spPr>
-          <p:style>
-            <a:lnRef idx="2">
-              <a:schemeClr val="accent1">
-                <a:shade val="50000"/>
-              </a:schemeClr>
-            </a:lnRef>
-            <a:fillRef idx="1">
-              <a:schemeClr val="accent1"/>
-            </a:fillRef>
-            <a:effectRef idx="0">
-              <a:schemeClr val="accent1"/>
-            </a:effectRef>
-            <a:fontRef idx="minor">
-              <a:schemeClr val="lt1"/>
-            </a:fontRef>
-          </p:style>
-          <p:txBody>
-            <a:bodyPr rtlCol="0" anchor="ctr"/>
-            <a:lstStyle/>
-            <a:p>
-              <a:pPr algn="ctr"/>
-              <a:r>
-                <a:rPr lang="nl-NL" dirty="0" smtClean="0"/>
-                <a:t>connection</a:t>
-              </a:r>
-              <a:endParaRPr lang="nl-NL" dirty="0"/>
-            </a:p>
-          </p:txBody>
-        </p:sp>
-        <p:sp>
-          <p:nvSpPr>
-            <p:cNvPr id="19" name="Oval 18"/>
-            <p:cNvSpPr/>
-            <p:nvPr/>
-          </p:nvSpPr>
-          <p:spPr>
-            <a:xfrm>
-              <a:off x="467544" y="3653408"/>
-              <a:ext cx="2448272" cy="648072"/>
-            </a:xfrm>
-            <a:prstGeom prst="ellipse">
-              <a:avLst/>
-            </a:prstGeom>
-          </p:spPr>
-          <p:style>
-            <a:lnRef idx="2">
-              <a:schemeClr val="accent1">
-                <a:shade val="50000"/>
-              </a:schemeClr>
-            </a:lnRef>
-            <a:fillRef idx="1">
-              <a:schemeClr val="accent1"/>
-            </a:fillRef>
-            <a:effectRef idx="0">
-              <a:schemeClr val="accent1"/>
-            </a:effectRef>
-            <a:fontRef idx="minor">
-              <a:schemeClr val="lt1"/>
-            </a:fontRef>
-          </p:style>
-          <p:txBody>
-            <a:bodyPr rtlCol="0" anchor="ctr"/>
-            <a:lstStyle/>
-            <a:p>
-              <a:pPr algn="ctr"/>
-              <a:r>
-                <a:rPr lang="nl-NL" dirty="0" smtClean="0"/>
-                <a:t>element</a:t>
-              </a:r>
-              <a:endParaRPr lang="nl-NL" dirty="0"/>
-            </a:p>
-          </p:txBody>
-        </p:sp>
-        <p:sp>
-          <p:nvSpPr>
-            <p:cNvPr id="20" name="Oval 19"/>
-            <p:cNvSpPr/>
-            <p:nvPr/>
-          </p:nvSpPr>
-          <p:spPr>
-            <a:xfrm>
-              <a:off x="4072136" y="3653408"/>
-              <a:ext cx="1584176" cy="648072"/>
-            </a:xfrm>
-            <a:prstGeom prst="ellipse">
-              <a:avLst/>
-            </a:prstGeom>
-          </p:spPr>
-          <p:style>
-            <a:lnRef idx="2">
-              <a:schemeClr val="accent1">
-                <a:shade val="50000"/>
-              </a:schemeClr>
-            </a:lnRef>
-            <a:fillRef idx="1">
-              <a:schemeClr val="accent1"/>
-            </a:fillRef>
-            <a:effectRef idx="0">
-              <a:schemeClr val="accent1"/>
-            </a:effectRef>
-            <a:fontRef idx="minor">
-              <a:schemeClr val="lt1"/>
-            </a:fontRef>
-          </p:style>
-          <p:txBody>
-            <a:bodyPr rtlCol="0" anchor="ctr"/>
-            <a:lstStyle/>
-            <a:p>
-              <a:pPr algn="ctr"/>
-              <a:r>
-                <a:rPr lang="nl-NL" dirty="0" smtClean="0"/>
-                <a:t>of</a:t>
-              </a:r>
-              <a:endParaRPr lang="nl-NL" dirty="0"/>
-            </a:p>
-          </p:txBody>
-        </p:sp>
-        <p:sp>
-          <p:nvSpPr>
-            <p:cNvPr id="21" name="Rectangle 20"/>
-            <p:cNvSpPr/>
-            <p:nvPr/>
-          </p:nvSpPr>
-          <p:spPr>
-            <a:xfrm>
-              <a:off x="4141298" y="4572347"/>
-              <a:ext cx="1445851" cy="504056"/>
-            </a:xfrm>
-            <a:prstGeom prst="rect">
-              <a:avLst/>
-            </a:prstGeom>
-          </p:spPr>
-          <p:style>
-            <a:lnRef idx="2">
-              <a:schemeClr val="accent1">
-                <a:shade val="50000"/>
-              </a:schemeClr>
-            </a:lnRef>
-            <a:fillRef idx="1">
-              <a:schemeClr val="accent1"/>
-            </a:fillRef>
-            <a:effectRef idx="0">
-              <a:schemeClr val="accent1"/>
-            </a:effectRef>
-            <a:fontRef idx="minor">
-              <a:schemeClr val="lt1"/>
-            </a:fontRef>
-          </p:style>
-          <p:txBody>
-            <a:bodyPr rtlCol="0" anchor="ctr"/>
-            <a:lstStyle/>
-            <a:p>
-              <a:pPr algn="ctr"/>
-              <a:r>
-                <a:rPr lang="en-US" dirty="0" smtClean="0"/>
-                <a:t>‘of the’</a:t>
-              </a:r>
-              <a:endParaRPr lang="nl-NL" dirty="0"/>
-            </a:p>
-          </p:txBody>
-        </p:sp>
-        <p:sp>
-          <p:nvSpPr>
-            <p:cNvPr id="22" name="TextBox 21"/>
-            <p:cNvSpPr txBox="1"/>
-            <p:nvPr/>
-          </p:nvSpPr>
-          <p:spPr>
-            <a:xfrm>
-              <a:off x="410587" y="4572347"/>
-              <a:ext cx="415498" cy="369332"/>
-            </a:xfrm>
-            <a:prstGeom prst="rect">
-              <a:avLst/>
-            </a:prstGeom>
-            <a:noFill/>
-          </p:spPr>
-          <p:txBody>
-            <a:bodyPr wrap="none" rtlCol="0">
-              <a:spAutoFit/>
-            </a:bodyPr>
-            <a:lstStyle/>
-            <a:p>
-              <a:r>
-                <a:rPr lang="en-US" dirty="0" smtClean="0"/>
-                <a:t>…</a:t>
-              </a:r>
-              <a:endParaRPr lang="nl-NL" dirty="0"/>
-            </a:p>
-          </p:txBody>
-        </p:sp>
-        <p:sp>
-          <p:nvSpPr>
-            <p:cNvPr id="23" name="TextBox 22"/>
-            <p:cNvSpPr txBox="1"/>
-            <p:nvPr/>
-          </p:nvSpPr>
-          <p:spPr>
-            <a:xfrm>
-              <a:off x="1483931" y="4585166"/>
-              <a:ext cx="415498" cy="369332"/>
-            </a:xfrm>
-            <a:prstGeom prst="rect">
-              <a:avLst/>
-            </a:prstGeom>
-            <a:noFill/>
-          </p:spPr>
-          <p:txBody>
-            <a:bodyPr wrap="none" rtlCol="0">
-              <a:spAutoFit/>
-            </a:bodyPr>
-            <a:lstStyle/>
-            <a:p>
-              <a:r>
-                <a:rPr lang="en-US" dirty="0" smtClean="0"/>
-                <a:t>…</a:t>
-              </a:r>
-              <a:endParaRPr lang="nl-NL" dirty="0"/>
-            </a:p>
-          </p:txBody>
-        </p:sp>
-        <p:sp>
-          <p:nvSpPr>
-            <p:cNvPr id="24" name="TextBox 23"/>
-            <p:cNvSpPr txBox="1"/>
-            <p:nvPr/>
-          </p:nvSpPr>
-          <p:spPr>
-            <a:xfrm>
-              <a:off x="2500318" y="4455043"/>
-              <a:ext cx="415498" cy="369332"/>
-            </a:xfrm>
-            <a:prstGeom prst="rect">
-              <a:avLst/>
-            </a:prstGeom>
-            <a:noFill/>
-          </p:spPr>
-          <p:txBody>
-            <a:bodyPr wrap="none" rtlCol="0">
-              <a:spAutoFit/>
-            </a:bodyPr>
-            <a:lstStyle/>
-            <a:p>
-              <a:r>
-                <a:rPr lang="en-US" dirty="0" smtClean="0"/>
-                <a:t>…</a:t>
-              </a:r>
-              <a:endParaRPr lang="nl-NL" dirty="0"/>
-            </a:p>
-          </p:txBody>
-        </p:sp>
-        <p:sp>
-          <p:nvSpPr>
-            <p:cNvPr id="25" name="Rectangle 24"/>
-            <p:cNvSpPr/>
-            <p:nvPr/>
-          </p:nvSpPr>
-          <p:spPr>
-            <a:xfrm>
-              <a:off x="6735085" y="4585167"/>
-              <a:ext cx="2022701" cy="491237"/>
-            </a:xfrm>
-            <a:prstGeom prst="rect">
-              <a:avLst/>
-            </a:prstGeom>
-          </p:spPr>
-          <p:style>
-            <a:lnRef idx="2">
-              <a:schemeClr val="accent1">
-                <a:shade val="50000"/>
-              </a:schemeClr>
-            </a:lnRef>
-            <a:fillRef idx="1">
-              <a:schemeClr val="accent1"/>
-            </a:fillRef>
-            <a:effectRef idx="0">
-              <a:schemeClr val="accent1"/>
-            </a:effectRef>
-            <a:fontRef idx="minor">
-              <a:schemeClr val="lt1"/>
-            </a:fontRef>
-          </p:style>
-          <p:txBody>
-            <a:bodyPr rtlCol="0" anchor="ctr"/>
-            <a:lstStyle/>
-            <a:p>
-              <a:pPr algn="ctr"/>
-              <a:r>
-                <a:rPr lang="en-US" dirty="0" smtClean="0"/>
-                <a:t>‘Constitution’</a:t>
-              </a:r>
-              <a:endParaRPr lang="nl-NL" dirty="0"/>
-            </a:p>
-          </p:txBody>
-        </p:sp>
-      </p:grpSp>
+        </p:nvCxnSpPr>
+        <p:spPr>
+          <a:xfrm flipH="1">
+            <a:off x="2071905" y="3107274"/>
+            <a:ext cx="2089620" cy="223914"/>
+          </a:xfrm>
+          <a:prstGeom prst="line">
+            <a:avLst/>
+          </a:prstGeom>
+          <a:ln w="38100"/>
+        </p:spPr>
+        <p:style>
+          <a:lnRef idx="1">
+            <a:schemeClr val="accent1"/>
+          </a:lnRef>
+          <a:fillRef idx="0">
+            <a:schemeClr val="accent1"/>
+          </a:fillRef>
+          <a:effectRef idx="0">
+            <a:schemeClr val="accent1"/>
+          </a:effectRef>
+          <a:fontRef idx="minor">
+            <a:schemeClr val="tx1"/>
+          </a:fontRef>
+        </p:style>
+      </p:cxnSp>
+      <p:cxnSp>
+        <p:nvCxnSpPr>
+          <p:cNvPr id="6" name="Straight Connector 5"/>
+          <p:cNvCxnSpPr>
+            <a:stCxn id="15" idx="4"/>
+            <a:endCxn id="18" idx="0"/>
+          </p:cNvCxnSpPr>
+          <p:nvPr/>
+        </p:nvCxnSpPr>
+        <p:spPr>
+          <a:xfrm>
+            <a:off x="4945575" y="3175620"/>
+            <a:ext cx="0" cy="155567"/>
+          </a:xfrm>
+          <a:prstGeom prst="line">
+            <a:avLst/>
+          </a:prstGeom>
+          <a:ln w="38100"/>
+        </p:spPr>
+        <p:style>
+          <a:lnRef idx="1">
+            <a:schemeClr val="accent1"/>
+          </a:lnRef>
+          <a:fillRef idx="0">
+            <a:schemeClr val="accent1"/>
+          </a:fillRef>
+          <a:effectRef idx="0">
+            <a:schemeClr val="accent1"/>
+          </a:effectRef>
+          <a:fontRef idx="minor">
+            <a:schemeClr val="tx1"/>
+          </a:fontRef>
+        </p:style>
+      </p:cxnSp>
+      <p:cxnSp>
+        <p:nvCxnSpPr>
+          <p:cNvPr id="7" name="Straight Connector 6"/>
+          <p:cNvCxnSpPr>
+            <a:stCxn id="15" idx="5"/>
+            <a:endCxn id="17" idx="0"/>
+          </p:cNvCxnSpPr>
+          <p:nvPr/>
+        </p:nvCxnSpPr>
+        <p:spPr>
+          <a:xfrm>
+            <a:off x="5729626" y="3107274"/>
+            <a:ext cx="1821128" cy="223914"/>
+          </a:xfrm>
+          <a:prstGeom prst="line">
+            <a:avLst/>
+          </a:prstGeom>
+          <a:ln w="38100"/>
+        </p:spPr>
+        <p:style>
+          <a:lnRef idx="1">
+            <a:schemeClr val="accent1"/>
+          </a:lnRef>
+          <a:fillRef idx="0">
+            <a:schemeClr val="accent1"/>
+          </a:fillRef>
+          <a:effectRef idx="0">
+            <a:schemeClr val="accent1"/>
+          </a:effectRef>
+          <a:fontRef idx="minor">
+            <a:schemeClr val="tx1"/>
+          </a:fontRef>
+        </p:style>
+      </p:cxnSp>
+      <p:cxnSp>
+        <p:nvCxnSpPr>
+          <p:cNvPr id="8" name="Straight Connector 7"/>
+          <p:cNvCxnSpPr>
+            <a:stCxn id="16" idx="4"/>
+            <a:endCxn id="19" idx="0"/>
+          </p:cNvCxnSpPr>
+          <p:nvPr/>
+        </p:nvCxnSpPr>
+        <p:spPr>
+          <a:xfrm>
+            <a:off x="2071905" y="3797888"/>
+            <a:ext cx="0" cy="109749"/>
+          </a:xfrm>
+          <a:prstGeom prst="line">
+            <a:avLst/>
+          </a:prstGeom>
+          <a:ln w="38100"/>
+        </p:spPr>
+        <p:style>
+          <a:lnRef idx="1">
+            <a:schemeClr val="accent1"/>
+          </a:lnRef>
+          <a:fillRef idx="0">
+            <a:schemeClr val="accent1"/>
+          </a:fillRef>
+          <a:effectRef idx="0">
+            <a:schemeClr val="accent1"/>
+          </a:effectRef>
+          <a:fontRef idx="minor">
+            <a:schemeClr val="tx1"/>
+          </a:fontRef>
+        </p:style>
+      </p:cxnSp>
+      <p:cxnSp>
+        <p:nvCxnSpPr>
+          <p:cNvPr id="9" name="Straight Connector 8"/>
+          <p:cNvCxnSpPr>
+            <a:stCxn id="19" idx="4"/>
+            <a:endCxn id="27" idx="0"/>
+          </p:cNvCxnSpPr>
+          <p:nvPr/>
+        </p:nvCxnSpPr>
+        <p:spPr>
+          <a:xfrm flipH="1">
+            <a:off x="2071904" y="4374336"/>
+            <a:ext cx="1" cy="288896"/>
+          </a:xfrm>
+          <a:prstGeom prst="line">
+            <a:avLst/>
+          </a:prstGeom>
+          <a:ln w="38100">
+            <a:prstDash val="dash"/>
+          </a:ln>
+        </p:spPr>
+        <p:style>
+          <a:lnRef idx="1">
+            <a:schemeClr val="accent1"/>
+          </a:lnRef>
+          <a:fillRef idx="0">
+            <a:schemeClr val="accent1"/>
+          </a:fillRef>
+          <a:effectRef idx="0">
+            <a:schemeClr val="accent1"/>
+          </a:effectRef>
+          <a:fontRef idx="minor">
+            <a:schemeClr val="tx1"/>
+          </a:fontRef>
+        </p:style>
+      </p:cxnSp>
+      <p:cxnSp>
+        <p:nvCxnSpPr>
+          <p:cNvPr id="10" name="Straight Connector 9"/>
+          <p:cNvCxnSpPr>
+            <a:stCxn id="19" idx="3"/>
+            <a:endCxn id="26" idx="0"/>
+          </p:cNvCxnSpPr>
+          <p:nvPr/>
+        </p:nvCxnSpPr>
+        <p:spPr>
+          <a:xfrm flipH="1">
+            <a:off x="963090" y="4305989"/>
+            <a:ext cx="324764" cy="357243"/>
+          </a:xfrm>
+          <a:prstGeom prst="line">
+            <a:avLst/>
+          </a:prstGeom>
+          <a:ln w="38100">
+            <a:prstDash val="dash"/>
+          </a:ln>
+        </p:spPr>
+        <p:style>
+          <a:lnRef idx="1">
+            <a:schemeClr val="accent1"/>
+          </a:lnRef>
+          <a:fillRef idx="0">
+            <a:schemeClr val="accent1"/>
+          </a:fillRef>
+          <a:effectRef idx="0">
+            <a:schemeClr val="accent1"/>
+          </a:effectRef>
+          <a:fontRef idx="minor">
+            <a:schemeClr val="tx1"/>
+          </a:fontRef>
+        </p:style>
+      </p:cxnSp>
+      <p:cxnSp>
+        <p:nvCxnSpPr>
+          <p:cNvPr id="11" name="Straight Connector 10"/>
+          <p:cNvCxnSpPr>
+            <a:stCxn id="19" idx="5"/>
+            <a:endCxn id="28" idx="0"/>
+          </p:cNvCxnSpPr>
+          <p:nvPr/>
+        </p:nvCxnSpPr>
+        <p:spPr>
+          <a:xfrm>
+            <a:off x="2855955" y="4305989"/>
+            <a:ext cx="199804" cy="357243"/>
+          </a:xfrm>
+          <a:prstGeom prst="line">
+            <a:avLst/>
+          </a:prstGeom>
+          <a:ln w="38100">
+            <a:prstDash val="dash"/>
+          </a:ln>
+        </p:spPr>
+        <p:style>
+          <a:lnRef idx="1">
+            <a:schemeClr val="accent1"/>
+          </a:lnRef>
+          <a:fillRef idx="0">
+            <a:schemeClr val="accent1"/>
+          </a:fillRef>
+          <a:effectRef idx="0">
+            <a:schemeClr val="accent1"/>
+          </a:effectRef>
+          <a:fontRef idx="minor">
+            <a:schemeClr val="tx1"/>
+          </a:fontRef>
+        </p:style>
+      </p:cxnSp>
+      <p:cxnSp>
+        <p:nvCxnSpPr>
+          <p:cNvPr id="12" name="Straight Connector 11"/>
+          <p:cNvCxnSpPr>
+            <a:stCxn id="18" idx="4"/>
+            <a:endCxn id="20" idx="0"/>
+          </p:cNvCxnSpPr>
+          <p:nvPr/>
+        </p:nvCxnSpPr>
+        <p:spPr>
+          <a:xfrm>
+            <a:off x="4945575" y="3797888"/>
+            <a:ext cx="0" cy="109749"/>
+          </a:xfrm>
+          <a:prstGeom prst="line">
+            <a:avLst/>
+          </a:prstGeom>
+          <a:ln w="38100"/>
+        </p:spPr>
+        <p:style>
+          <a:lnRef idx="1">
+            <a:schemeClr val="accent1"/>
+          </a:lnRef>
+          <a:fillRef idx="0">
+            <a:schemeClr val="accent1"/>
+          </a:fillRef>
+          <a:effectRef idx="0">
+            <a:schemeClr val="accent1"/>
+          </a:effectRef>
+          <a:fontRef idx="minor">
+            <a:schemeClr val="tx1"/>
+          </a:fontRef>
+        </p:style>
+      </p:cxnSp>
+      <p:cxnSp>
+        <p:nvCxnSpPr>
+          <p:cNvPr id="13" name="Straight Connector 12"/>
+          <p:cNvCxnSpPr>
+            <a:stCxn id="20" idx="4"/>
+            <a:endCxn id="21" idx="0"/>
+          </p:cNvCxnSpPr>
+          <p:nvPr/>
+        </p:nvCxnSpPr>
+        <p:spPr>
+          <a:xfrm flipH="1">
+            <a:off x="4945575" y="4374336"/>
+            <a:ext cx="1" cy="279664"/>
+          </a:xfrm>
+          <a:prstGeom prst="line">
+            <a:avLst/>
+          </a:prstGeom>
+          <a:ln w="38100"/>
+        </p:spPr>
+        <p:style>
+          <a:lnRef idx="1">
+            <a:schemeClr val="accent1"/>
+          </a:lnRef>
+          <a:fillRef idx="0">
+            <a:schemeClr val="accent1"/>
+          </a:fillRef>
+          <a:effectRef idx="0">
+            <a:schemeClr val="accent1"/>
+          </a:effectRef>
+          <a:fontRef idx="minor">
+            <a:schemeClr val="tx1"/>
+          </a:fontRef>
+        </p:style>
+      </p:cxnSp>
+      <p:cxnSp>
+        <p:nvCxnSpPr>
+          <p:cNvPr id="14" name="Straight Connector 13"/>
+          <p:cNvCxnSpPr>
+            <a:stCxn id="17" idx="4"/>
+            <a:endCxn id="25" idx="0"/>
+          </p:cNvCxnSpPr>
+          <p:nvPr/>
+        </p:nvCxnSpPr>
+        <p:spPr>
+          <a:xfrm>
+            <a:off x="7550754" y="3797887"/>
+            <a:ext cx="5510" cy="865345"/>
+          </a:xfrm>
+          <a:prstGeom prst="line">
+            <a:avLst/>
+          </a:prstGeom>
+          <a:ln w="38100">
+            <a:prstDash val="dash"/>
+          </a:ln>
+        </p:spPr>
+        <p:style>
+          <a:lnRef idx="1">
+            <a:schemeClr val="accent1"/>
+          </a:lnRef>
+          <a:fillRef idx="0">
+            <a:schemeClr val="accent1"/>
+          </a:fillRef>
+          <a:effectRef idx="0">
+            <a:schemeClr val="accent1"/>
+          </a:effectRef>
+          <a:fontRef idx="minor">
+            <a:schemeClr val="tx1"/>
+          </a:fontRef>
+        </p:style>
+      </p:cxnSp>
+      <p:sp>
+        <p:nvSpPr>
+          <p:cNvPr id="15" name="Oval 14"/>
+          <p:cNvSpPr/>
+          <p:nvPr/>
+        </p:nvSpPr>
+        <p:spPr>
+          <a:xfrm>
+            <a:off x="3836761" y="2708920"/>
+            <a:ext cx="2217629" cy="466700"/>
+          </a:xfrm>
+          <a:prstGeom prst="ellipse">
+            <a:avLst/>
+          </a:prstGeom>
+        </p:spPr>
+        <p:style>
+          <a:lnRef idx="2">
+            <a:schemeClr val="accent1">
+              <a:shade val="50000"/>
+            </a:schemeClr>
+          </a:lnRef>
+          <a:fillRef idx="1">
+            <a:schemeClr val="accent1"/>
+          </a:fillRef>
+          <a:effectRef idx="0">
+            <a:schemeClr val="accent1"/>
+          </a:effectRef>
+          <a:fontRef idx="minor">
+            <a:schemeClr val="lt1"/>
+          </a:fontRef>
+        </p:style>
+        <p:txBody>
+          <a:bodyPr rtlCol="0" anchor="ctr"/>
+          <a:lstStyle/>
+          <a:p>
+            <a:pPr algn="ctr"/>
+            <a:r>
+              <a:rPr lang="en-US" dirty="0" smtClean="0"/>
+              <a:t>reference</a:t>
+            </a:r>
+            <a:endParaRPr lang="nl-NL" dirty="0"/>
+          </a:p>
+        </p:txBody>
+      </p:sp>
+      <p:sp>
+        <p:nvSpPr>
+          <p:cNvPr id="16" name="Oval 15"/>
+          <p:cNvSpPr/>
+          <p:nvPr/>
+        </p:nvSpPr>
+        <p:spPr>
+          <a:xfrm>
+            <a:off x="963090" y="3331187"/>
+            <a:ext cx="2217629" cy="466700"/>
+          </a:xfrm>
+          <a:prstGeom prst="ellipse">
+            <a:avLst/>
+          </a:prstGeom>
+        </p:spPr>
+        <p:style>
+          <a:lnRef idx="2">
+            <a:schemeClr val="accent1">
+              <a:shade val="50000"/>
+            </a:schemeClr>
+          </a:lnRef>
+          <a:fillRef idx="1">
+            <a:schemeClr val="accent1"/>
+          </a:fillRef>
+          <a:effectRef idx="0">
+            <a:schemeClr val="accent1"/>
+          </a:effectRef>
+          <a:fontRef idx="minor">
+            <a:schemeClr val="lt1"/>
+          </a:fontRef>
+        </p:style>
+        <p:txBody>
+          <a:bodyPr rtlCol="0" anchor="ctr"/>
+          <a:lstStyle/>
+          <a:p>
+            <a:pPr algn="ctr"/>
+            <a:r>
+              <a:rPr lang="en-US" dirty="0" smtClean="0"/>
+              <a:t>elements</a:t>
+            </a:r>
+            <a:endParaRPr lang="nl-NL" dirty="0"/>
+          </a:p>
+        </p:txBody>
+      </p:sp>
+      <p:sp>
+        <p:nvSpPr>
+          <p:cNvPr id="17" name="Oval 16"/>
+          <p:cNvSpPr/>
+          <p:nvPr/>
+        </p:nvSpPr>
+        <p:spPr>
+          <a:xfrm>
+            <a:off x="6833285" y="3331187"/>
+            <a:ext cx="1434937" cy="466700"/>
+          </a:xfrm>
+          <a:prstGeom prst="ellipse">
+            <a:avLst/>
+          </a:prstGeom>
+        </p:spPr>
+        <p:style>
+          <a:lnRef idx="2">
+            <a:schemeClr val="accent1">
+              <a:shade val="50000"/>
+            </a:schemeClr>
+          </a:lnRef>
+          <a:fillRef idx="1">
+            <a:schemeClr val="accent1"/>
+          </a:fillRef>
+          <a:effectRef idx="0">
+            <a:schemeClr val="accent1"/>
+          </a:effectRef>
+          <a:fontRef idx="minor">
+            <a:schemeClr val="lt1"/>
+          </a:fontRef>
+        </p:style>
+        <p:txBody>
+          <a:bodyPr rtlCol="0" anchor="ctr"/>
+          <a:lstStyle/>
+          <a:p>
+            <a:pPr algn="ctr"/>
+            <a:r>
+              <a:rPr lang="nl-NL" dirty="0" smtClean="0"/>
+              <a:t>law</a:t>
+            </a:r>
+            <a:endParaRPr lang="nl-NL" dirty="0"/>
+          </a:p>
+        </p:txBody>
+      </p:sp>
+      <p:sp>
+        <p:nvSpPr>
+          <p:cNvPr id="18" name="Oval 17"/>
+          <p:cNvSpPr/>
+          <p:nvPr/>
+        </p:nvSpPr>
+        <p:spPr>
+          <a:xfrm>
+            <a:off x="3383987" y="3331187"/>
+            <a:ext cx="3123177" cy="466700"/>
+          </a:xfrm>
+          <a:prstGeom prst="ellipse">
+            <a:avLst/>
+          </a:prstGeom>
+        </p:spPr>
+        <p:style>
+          <a:lnRef idx="2">
+            <a:schemeClr val="accent1">
+              <a:shade val="50000"/>
+            </a:schemeClr>
+          </a:lnRef>
+          <a:fillRef idx="1">
+            <a:schemeClr val="accent1"/>
+          </a:fillRef>
+          <a:effectRef idx="0">
+            <a:schemeClr val="accent1"/>
+          </a:effectRef>
+          <a:fontRef idx="minor">
+            <a:schemeClr val="lt1"/>
+          </a:fontRef>
+        </p:style>
+        <p:txBody>
+          <a:bodyPr rtlCol="0" anchor="ctr"/>
+          <a:lstStyle/>
+          <a:p>
+            <a:pPr algn="ctr"/>
+            <a:r>
+              <a:rPr lang="nl-NL" dirty="0" smtClean="0"/>
+              <a:t>connection</a:t>
+            </a:r>
+            <a:endParaRPr lang="nl-NL" dirty="0"/>
+          </a:p>
+        </p:txBody>
+      </p:sp>
+      <p:sp>
+        <p:nvSpPr>
+          <p:cNvPr id="19" name="Oval 18"/>
+          <p:cNvSpPr/>
+          <p:nvPr/>
+        </p:nvSpPr>
+        <p:spPr>
+          <a:xfrm>
+            <a:off x="963090" y="3907636"/>
+            <a:ext cx="2217629" cy="466700"/>
+          </a:xfrm>
+          <a:prstGeom prst="ellipse">
+            <a:avLst/>
+          </a:prstGeom>
+        </p:spPr>
+        <p:style>
+          <a:lnRef idx="2">
+            <a:schemeClr val="accent1">
+              <a:shade val="50000"/>
+            </a:schemeClr>
+          </a:lnRef>
+          <a:fillRef idx="1">
+            <a:schemeClr val="accent1"/>
+          </a:fillRef>
+          <a:effectRef idx="0">
+            <a:schemeClr val="accent1"/>
+          </a:effectRef>
+          <a:fontRef idx="minor">
+            <a:schemeClr val="lt1"/>
+          </a:fontRef>
+        </p:style>
+        <p:txBody>
+          <a:bodyPr rtlCol="0" anchor="ctr"/>
+          <a:lstStyle/>
+          <a:p>
+            <a:pPr algn="ctr"/>
+            <a:r>
+              <a:rPr lang="nl-NL" dirty="0" smtClean="0"/>
+              <a:t>element</a:t>
+            </a:r>
+            <a:endParaRPr lang="nl-NL" dirty="0"/>
+          </a:p>
+        </p:txBody>
+      </p:sp>
+      <p:sp>
+        <p:nvSpPr>
+          <p:cNvPr id="20" name="Oval 19"/>
+          <p:cNvSpPr/>
+          <p:nvPr/>
+        </p:nvSpPr>
+        <p:spPr>
+          <a:xfrm>
+            <a:off x="4228107" y="3907636"/>
+            <a:ext cx="1434937" cy="466700"/>
+          </a:xfrm>
+          <a:prstGeom prst="ellipse">
+            <a:avLst/>
+          </a:prstGeom>
+        </p:spPr>
+        <p:style>
+          <a:lnRef idx="2">
+            <a:schemeClr val="accent1">
+              <a:shade val="50000"/>
+            </a:schemeClr>
+          </a:lnRef>
+          <a:fillRef idx="1">
+            <a:schemeClr val="accent1"/>
+          </a:fillRef>
+          <a:effectRef idx="0">
+            <a:schemeClr val="accent1"/>
+          </a:effectRef>
+          <a:fontRef idx="minor">
+            <a:schemeClr val="lt1"/>
+          </a:fontRef>
+        </p:style>
+        <p:txBody>
+          <a:bodyPr rtlCol="0" anchor="ctr"/>
+          <a:lstStyle/>
+          <a:p>
+            <a:pPr algn="ctr"/>
+            <a:r>
+              <a:rPr lang="nl-NL" dirty="0" smtClean="0"/>
+              <a:t>of</a:t>
+            </a:r>
+            <a:endParaRPr lang="nl-NL" dirty="0"/>
+          </a:p>
+        </p:txBody>
+      </p:sp>
+      <p:sp>
+        <p:nvSpPr>
+          <p:cNvPr id="21" name="Rectangle 20"/>
+          <p:cNvSpPr/>
+          <p:nvPr/>
+        </p:nvSpPr>
+        <p:spPr>
+          <a:xfrm>
+            <a:off x="4290753" y="4654000"/>
+            <a:ext cx="1309643" cy="362989"/>
+          </a:xfrm>
+          <a:prstGeom prst="rect">
+            <a:avLst/>
+          </a:prstGeom>
+        </p:spPr>
+        <p:style>
+          <a:lnRef idx="2">
+            <a:schemeClr val="accent1">
+              <a:shade val="50000"/>
+            </a:schemeClr>
+          </a:lnRef>
+          <a:fillRef idx="1">
+            <a:schemeClr val="accent1"/>
+          </a:fillRef>
+          <a:effectRef idx="0">
+            <a:schemeClr val="accent1"/>
+          </a:effectRef>
+          <a:fontRef idx="minor">
+            <a:schemeClr val="lt1"/>
+          </a:fontRef>
+        </p:style>
+        <p:txBody>
+          <a:bodyPr rtlCol="0" anchor="ctr"/>
+          <a:lstStyle/>
+          <a:p>
+            <a:pPr algn="ctr"/>
+            <a:r>
+              <a:rPr lang="en-US" dirty="0" smtClean="0"/>
+              <a:t>‘of the’</a:t>
+            </a:r>
+            <a:endParaRPr lang="nl-NL" dirty="0"/>
+          </a:p>
+        </p:txBody>
+      </p:sp>
+      <p:sp>
+        <p:nvSpPr>
+          <p:cNvPr id="25" name="Rectangle 24"/>
+          <p:cNvSpPr/>
+          <p:nvPr/>
+        </p:nvSpPr>
+        <p:spPr>
+          <a:xfrm>
+            <a:off x="6640189" y="4663232"/>
+            <a:ext cx="1832150" cy="353758"/>
+          </a:xfrm>
+          <a:prstGeom prst="rect">
+            <a:avLst/>
+          </a:prstGeom>
+        </p:spPr>
+        <p:style>
+          <a:lnRef idx="2">
+            <a:schemeClr val="accent1">
+              <a:shade val="50000"/>
+            </a:schemeClr>
+          </a:lnRef>
+          <a:fillRef idx="1">
+            <a:schemeClr val="accent1"/>
+          </a:fillRef>
+          <a:effectRef idx="0">
+            <a:schemeClr val="accent1"/>
+          </a:effectRef>
+          <a:fontRef idx="minor">
+            <a:schemeClr val="lt1"/>
+          </a:fontRef>
+        </p:style>
+        <p:txBody>
+          <a:bodyPr rtlCol="0" anchor="ctr"/>
+          <a:lstStyle/>
+          <a:p>
+            <a:pPr algn="ctr"/>
+            <a:r>
+              <a:rPr lang="en-US" dirty="0" smtClean="0"/>
+              <a:t>‘Constitution’</a:t>
+            </a:r>
+            <a:endParaRPr lang="nl-NL" dirty="0"/>
+          </a:p>
+        </p:txBody>
+      </p:sp>
+      <p:sp>
+        <p:nvSpPr>
+          <p:cNvPr id="26" name="Rectangle 25"/>
+          <p:cNvSpPr/>
+          <p:nvPr/>
+        </p:nvSpPr>
+        <p:spPr>
+          <a:xfrm>
+            <a:off x="459034" y="4663232"/>
+            <a:ext cx="1008112" cy="362989"/>
+          </a:xfrm>
+          <a:prstGeom prst="rect">
+            <a:avLst/>
+          </a:prstGeom>
+        </p:spPr>
+        <p:style>
+          <a:lnRef idx="2">
+            <a:schemeClr val="accent1">
+              <a:shade val="50000"/>
+            </a:schemeClr>
+          </a:lnRef>
+          <a:fillRef idx="1">
+            <a:schemeClr val="accent1"/>
+          </a:fillRef>
+          <a:effectRef idx="0">
+            <a:schemeClr val="accent1"/>
+          </a:effectRef>
+          <a:fontRef idx="minor">
+            <a:schemeClr val="lt1"/>
+          </a:fontRef>
+        </p:style>
+        <p:txBody>
+          <a:bodyPr rtlCol="0" anchor="ctr"/>
+          <a:lstStyle/>
+          <a:p>
+            <a:pPr algn="ctr"/>
+            <a:r>
+              <a:rPr lang="en-US" dirty="0" smtClean="0"/>
+              <a:t>‘art. 3’</a:t>
+            </a:r>
+            <a:endParaRPr lang="nl-NL" dirty="0"/>
+          </a:p>
+        </p:txBody>
+      </p:sp>
+      <p:sp>
+        <p:nvSpPr>
+          <p:cNvPr id="27" name="Rectangle 26"/>
+          <p:cNvSpPr/>
+          <p:nvPr/>
+        </p:nvSpPr>
+        <p:spPr>
+          <a:xfrm>
+            <a:off x="1743676" y="4663232"/>
+            <a:ext cx="656456" cy="362989"/>
+          </a:xfrm>
+          <a:prstGeom prst="rect">
+            <a:avLst/>
+          </a:prstGeom>
+        </p:spPr>
+        <p:style>
+          <a:lnRef idx="2">
+            <a:schemeClr val="accent1">
+              <a:shade val="50000"/>
+            </a:schemeClr>
+          </a:lnRef>
+          <a:fillRef idx="1">
+            <a:schemeClr val="accent1"/>
+          </a:fillRef>
+          <a:effectRef idx="0">
+            <a:schemeClr val="accent1"/>
+          </a:effectRef>
+          <a:fontRef idx="minor">
+            <a:schemeClr val="lt1"/>
+          </a:fontRef>
+        </p:style>
+        <p:txBody>
+          <a:bodyPr rtlCol="0" anchor="ctr"/>
+          <a:lstStyle/>
+          <a:p>
+            <a:pPr algn="ctr"/>
+            <a:r>
+              <a:rPr lang="en-US" dirty="0" smtClean="0"/>
+              <a:t>‘4’</a:t>
+            </a:r>
+            <a:endParaRPr lang="nl-NL" dirty="0"/>
+          </a:p>
+        </p:txBody>
+      </p:sp>
+      <p:sp>
+        <p:nvSpPr>
+          <p:cNvPr id="28" name="Rectangle 27"/>
+          <p:cNvSpPr/>
+          <p:nvPr/>
+        </p:nvSpPr>
+        <p:spPr>
+          <a:xfrm>
+            <a:off x="2727531" y="4663232"/>
+            <a:ext cx="656456" cy="362989"/>
+          </a:xfrm>
+          <a:prstGeom prst="rect">
+            <a:avLst/>
+          </a:prstGeom>
+        </p:spPr>
+        <p:style>
+          <a:lnRef idx="2">
+            <a:schemeClr val="accent1">
+              <a:shade val="50000"/>
+            </a:schemeClr>
+          </a:lnRef>
+          <a:fillRef idx="1">
+            <a:schemeClr val="accent1"/>
+          </a:fillRef>
+          <a:effectRef idx="0">
+            <a:schemeClr val="accent1"/>
+          </a:effectRef>
+          <a:fontRef idx="minor">
+            <a:schemeClr val="lt1"/>
+          </a:fontRef>
+        </p:style>
+        <p:txBody>
+          <a:bodyPr rtlCol="0" anchor="ctr"/>
+          <a:lstStyle/>
+          <a:p>
+            <a:pPr algn="ctr"/>
+            <a:r>
+              <a:rPr lang="en-US" dirty="0" smtClean="0"/>
+              <a:t>‘5’</a:t>
+            </a:r>
+            <a:endParaRPr lang="nl-NL" dirty="0"/>
+          </a:p>
+        </p:txBody>
+      </p:sp>
     </p:spTree>
     <p:extLst>
       <p:ext uri="{BB962C8B-B14F-4D97-AF65-F5344CB8AC3E}">
@@ -8145,7 +8250,9 @@
         </p:nvSpPr>
         <p:spPr/>
         <p:txBody>
-          <a:bodyPr/>
+          <a:bodyPr>
+            <a:normAutofit/>
+          </a:bodyPr>
           <a:lstStyle/>
           <a:p>
             <a:r>
@@ -8157,8 +8264,148 @@
             </a:br>
             <a:r>
               <a:rPr lang="en-US" dirty="0" smtClean="0"/>
-              <a:t>(parsing expressions, non-terminals).</a:t>
-            </a:r>
+              <a:t>(parsing expressions, non-terminals</a:t>
+            </a:r>
+            <a:r>
+              <a:rPr lang="en-US" dirty="0" smtClean="0"/>
+              <a:t>).</a:t>
+            </a:r>
+          </a:p>
+          <a:p>
+            <a:pPr lvl="1"/>
+            <a:r>
+              <a:rPr lang="en-US" sz="1400" dirty="0" smtClean="0">
+                <a:latin typeface="Consolas" panose="020B0609020204030204" pitchFamily="49" charset="0"/>
+              </a:rPr>
+              <a:t>LJN &lt;- </a:t>
+            </a:r>
+            <a:r>
+              <a:rPr lang="en-US" sz="1400" dirty="0" err="1">
+                <a:latin typeface="Consolas" panose="020B0609020204030204" pitchFamily="49" charset="0"/>
+              </a:rPr>
+              <a:t>LJN_label</a:t>
+            </a:r>
+            <a:r>
+              <a:rPr lang="en-US" sz="1400" dirty="0">
+                <a:latin typeface="Consolas" panose="020B0609020204030204" pitchFamily="49" charset="0"/>
+              </a:rPr>
+              <a:t> </a:t>
+            </a:r>
+            <a:r>
+              <a:rPr lang="en-US" sz="1400" dirty="0" err="1" smtClean="0">
+                <a:latin typeface="Consolas" panose="020B0609020204030204" pitchFamily="49" charset="0"/>
+              </a:rPr>
+              <a:t>LJN_content</a:t>
+            </a:r>
+            <a:r>
+              <a:rPr lang="en-US" sz="1400" dirty="0" smtClean="0">
+                <a:latin typeface="Consolas" panose="020B0609020204030204" pitchFamily="49" charset="0"/>
+              </a:rPr>
+              <a:t/>
+            </a:r>
+            <a:br>
+              <a:rPr lang="en-US" sz="1400" dirty="0" smtClean="0">
+                <a:latin typeface="Consolas" panose="020B0609020204030204" pitchFamily="49" charset="0"/>
+              </a:rPr>
+            </a:br>
+            <a:r>
+              <a:rPr lang="en-US" sz="1400" dirty="0" err="1" smtClean="0">
+                <a:latin typeface="Consolas" panose="020B0609020204030204" pitchFamily="49" charset="0"/>
+              </a:rPr>
+              <a:t>LJN_label</a:t>
+            </a:r>
+            <a:r>
+              <a:rPr lang="en-US" sz="1400" dirty="0" smtClean="0">
+                <a:latin typeface="Consolas" panose="020B0609020204030204" pitchFamily="49" charset="0"/>
+              </a:rPr>
+              <a:t> &lt;- </a:t>
+            </a:r>
+            <a:r>
+              <a:rPr lang="en-US" sz="1400" dirty="0">
+                <a:latin typeface="Consolas" panose="020B0609020204030204" pitchFamily="49" charset="0"/>
+              </a:rPr>
+              <a:t>("LJ" ?"N"|"ELRO") ?(</a:t>
+            </a:r>
+            <a:r>
+              <a:rPr lang="en-US" sz="1400" dirty="0" err="1">
+                <a:latin typeface="Consolas" panose="020B0609020204030204" pitchFamily="49" charset="0"/>
+              </a:rPr>
+              <a:t>sp</a:t>
+            </a:r>
+            <a:r>
+              <a:rPr lang="en-US" sz="1400" dirty="0">
+                <a:latin typeface="Consolas" panose="020B0609020204030204" pitchFamily="49" charset="0"/>
+              </a:rPr>
+              <a:t>|'-') ?("N" ?"UMME" "R") +(</a:t>
+            </a:r>
+            <a:r>
+              <a:rPr lang="en-US" sz="1400" dirty="0" err="1">
+                <a:latin typeface="Consolas" panose="020B0609020204030204" pitchFamily="49" charset="0"/>
+              </a:rPr>
+              <a:t>sp</a:t>
+            </a:r>
+            <a:r>
+              <a:rPr lang="en-US" sz="1400" dirty="0" smtClean="0">
+                <a:latin typeface="Consolas" panose="020B0609020204030204" pitchFamily="49" charset="0"/>
+              </a:rPr>
+              <a:t>|[:.=])</a:t>
+            </a:r>
+            <a:br>
+              <a:rPr lang="en-US" sz="1400" dirty="0" smtClean="0">
+                <a:latin typeface="Consolas" panose="020B0609020204030204" pitchFamily="49" charset="0"/>
+              </a:rPr>
+            </a:br>
+            <a:r>
+              <a:rPr lang="pl-PL" sz="1400" dirty="0" smtClean="0">
+                <a:latin typeface="Consolas" panose="020B0609020204030204" pitchFamily="49" charset="0"/>
+              </a:rPr>
+              <a:t>LJN_content</a:t>
+            </a:r>
+            <a:r>
+              <a:rPr lang="en-US" sz="1400" dirty="0" smtClean="0">
+                <a:latin typeface="Consolas" panose="020B0609020204030204" pitchFamily="49" charset="0"/>
+              </a:rPr>
+              <a:t> </a:t>
+            </a:r>
+            <a:r>
+              <a:rPr lang="pl-PL" sz="1400" dirty="0" smtClean="0">
+                <a:latin typeface="Consolas" panose="020B0609020204030204" pitchFamily="49" charset="0"/>
+              </a:rPr>
+              <a:t>&lt;- [</a:t>
+            </a:r>
+            <a:r>
+              <a:rPr lang="pl-PL" sz="1400" dirty="0">
+                <a:latin typeface="Consolas" panose="020B0609020204030204" pitchFamily="49" charset="0"/>
+              </a:rPr>
+              <a:t>A-Za-z] [A-Za-z</a:t>
+            </a:r>
+            <a:r>
+              <a:rPr lang="pl-PL" sz="1400" dirty="0" smtClean="0">
+                <a:latin typeface="Consolas" panose="020B0609020204030204" pitchFamily="49" charset="0"/>
+              </a:rPr>
+              <a:t>]</a:t>
+            </a:r>
+            <a:r>
+              <a:rPr lang="en-US" sz="1400" dirty="0" smtClean="0">
+                <a:latin typeface="Consolas" panose="020B0609020204030204" pitchFamily="49" charset="0"/>
+              </a:rPr>
+              <a:t> </a:t>
+            </a:r>
+            <a:r>
+              <a:rPr lang="pl-PL" sz="1400" dirty="0" smtClean="0">
+                <a:latin typeface="Consolas" panose="020B0609020204030204" pitchFamily="49" charset="0"/>
+              </a:rPr>
+              <a:t>?:</a:t>
+            </a:r>
+            <a:r>
+              <a:rPr lang="pl-PL" sz="1400" dirty="0">
+                <a:latin typeface="Consolas" panose="020B0609020204030204" pitchFamily="49" charset="0"/>
+              </a:rPr>
+              <a:t>sp [0-9] [0-9] [0-9] [0-9]</a:t>
+            </a:r>
+            <a:endParaRPr lang="en-US" sz="1400" dirty="0" smtClean="0">
+              <a:latin typeface="Consolas" panose="020B0609020204030204" pitchFamily="49" charset="0"/>
+            </a:endParaRPr>
           </a:p>
           <a:p>
             <a:r>
@@ -8169,15 +8416,7 @@
           <a:p>
             <a:r>
               <a:rPr lang="en-US" dirty="0" smtClean="0"/>
-              <a:t>Syntax similar to </a:t>
-            </a:r>
-            <a:r>
-              <a:rPr lang="en-US" dirty="0" smtClean="0"/>
-              <a:t>CFG, </a:t>
-            </a:r>
-            <a:r>
-              <a:rPr lang="en-US" dirty="0" smtClean="0"/>
-              <a:t>BNF.</a:t>
+              <a:t>Syntax similar to CFG, BNF.</a:t>
             </a:r>
           </a:p>
           <a:p>

</xml_diff>